<commit_message>
This is a test commit
</commit_message>
<xml_diff>
--- a/retreat_poster.pptx
+++ b/retreat_poster.pptx
@@ -1049,11 +1049,11 @@
         </c:dLbls>
         <c:gapWidth val="150"/>
         <c:overlap val="100"/>
-        <c:axId val="-477046896"/>
-        <c:axId val="-477043504"/>
+        <c:axId val="829111888"/>
+        <c:axId val="829114784"/>
       </c:barChart>
       <c:catAx>
-        <c:axId val="-477046896"/>
+        <c:axId val="829111888"/>
         <c:scaling>
           <c:orientation val="minMax"/>
         </c:scaling>
@@ -1081,7 +1081,7 @@
         <c:majorTickMark val="out"/>
         <c:minorTickMark val="none"/>
         <c:tickLblPos val="nextTo"/>
-        <c:crossAx val="-477043504"/>
+        <c:crossAx val="829114784"/>
         <c:crosses val="autoZero"/>
         <c:auto val="1"/>
         <c:lblAlgn val="ctr"/>
@@ -1089,7 +1089,7 @@
         <c:noMultiLvlLbl val="0"/>
       </c:catAx>
       <c:valAx>
-        <c:axId val="-477043504"/>
+        <c:axId val="829114784"/>
         <c:scaling>
           <c:orientation val="minMax"/>
           <c:max val="6.0"/>
@@ -1100,7 +1100,7 @@
         <c:majorTickMark val="out"/>
         <c:minorTickMark val="none"/>
         <c:tickLblPos val="none"/>
-        <c:crossAx val="-477046896"/>
+        <c:crossAx val="829111888"/>
         <c:crosses val="autoZero"/>
         <c:crossBetween val="between"/>
       </c:valAx>
@@ -1834,11 +1834,11 @@
           <c:showPercent val="0"/>
           <c:showBubbleSize val="0"/>
         </c:dLbls>
-        <c:axId val="-477019680"/>
-        <c:axId val="-477016288"/>
+        <c:axId val="827808272"/>
+        <c:axId val="827812304"/>
       </c:scatterChart>
       <c:valAx>
-        <c:axId val="-477019680"/>
+        <c:axId val="827808272"/>
         <c:scaling>
           <c:orientation val="minMax"/>
         </c:scaling>
@@ -1867,12 +1867,12 @@
         <c:majorTickMark val="out"/>
         <c:minorTickMark val="none"/>
         <c:tickLblPos val="nextTo"/>
-        <c:crossAx val="-477016288"/>
+        <c:crossAx val="827812304"/>
         <c:crosses val="autoZero"/>
         <c:crossBetween val="midCat"/>
       </c:valAx>
       <c:valAx>
-        <c:axId val="-477016288"/>
+        <c:axId val="827812304"/>
         <c:scaling>
           <c:orientation val="minMax"/>
         </c:scaling>
@@ -1902,7 +1902,7 @@
         <c:majorTickMark val="out"/>
         <c:minorTickMark val="none"/>
         <c:tickLblPos val="nextTo"/>
-        <c:crossAx val="-477019680"/>
+        <c:crossAx val="827808272"/>
         <c:crosses val="autoZero"/>
         <c:crossBetween val="midCat"/>
       </c:valAx>
@@ -2641,11 +2641,11 @@
           <c:showPercent val="0"/>
           <c:showBubbleSize val="0"/>
         </c:dLbls>
-        <c:axId val="-476991440"/>
-        <c:axId val="-476988048"/>
+        <c:axId val="827837632"/>
+        <c:axId val="827841664"/>
       </c:scatterChart>
       <c:valAx>
-        <c:axId val="-476991440"/>
+        <c:axId val="827837632"/>
         <c:scaling>
           <c:orientation val="minMax"/>
         </c:scaling>
@@ -2674,12 +2674,12 @@
         <c:majorTickMark val="out"/>
         <c:minorTickMark val="none"/>
         <c:tickLblPos val="nextTo"/>
-        <c:crossAx val="-476988048"/>
+        <c:crossAx val="827841664"/>
         <c:crosses val="autoZero"/>
         <c:crossBetween val="midCat"/>
       </c:valAx>
       <c:valAx>
-        <c:axId val="-476988048"/>
+        <c:axId val="827841664"/>
         <c:scaling>
           <c:orientation val="minMax"/>
         </c:scaling>
@@ -2709,7 +2709,7 @@
         <c:majorTickMark val="out"/>
         <c:minorTickMark val="none"/>
         <c:tickLblPos val="nextTo"/>
-        <c:crossAx val="-476991440"/>
+        <c:crossAx val="827837632"/>
         <c:crosses val="autoZero"/>
         <c:crossBetween val="midCat"/>
       </c:valAx>
@@ -2921,7 +2921,7 @@
             <a:fld id="{844E2C54-3F4A-4984-9B06-D8EE6B21806F}" type="datetimeFigureOut">
               <a:rPr lang="en-US" smtClean="0"/>
               <a:pPr/>
-              <a:t>11/2/17</a:t>
+              <a:t>12/8/17</a:t>
             </a:fld>
             <a:endParaRPr lang="en-US"/>
           </a:p>
@@ -3088,7 +3088,7 @@
             <a:fld id="{844E2C54-3F4A-4984-9B06-D8EE6B21806F}" type="datetimeFigureOut">
               <a:rPr lang="en-US" smtClean="0"/>
               <a:pPr/>
-              <a:t>11/2/17</a:t>
+              <a:t>12/8/17</a:t>
             </a:fld>
             <a:endParaRPr lang="en-US"/>
           </a:p>
@@ -3265,7 +3265,7 @@
             <a:fld id="{844E2C54-3F4A-4984-9B06-D8EE6B21806F}" type="datetimeFigureOut">
               <a:rPr lang="en-US" smtClean="0"/>
               <a:pPr/>
-              <a:t>11/2/17</a:t>
+              <a:t>12/8/17</a:t>
             </a:fld>
             <a:endParaRPr lang="en-US"/>
           </a:p>
@@ -3432,7 +3432,7 @@
             <a:fld id="{844E2C54-3F4A-4984-9B06-D8EE6B21806F}" type="datetimeFigureOut">
               <a:rPr lang="en-US" smtClean="0"/>
               <a:pPr/>
-              <a:t>11/2/17</a:t>
+              <a:t>12/8/17</a:t>
             </a:fld>
             <a:endParaRPr lang="en-US"/>
           </a:p>
@@ -3675,7 +3675,7 @@
             <a:fld id="{844E2C54-3F4A-4984-9B06-D8EE6B21806F}" type="datetimeFigureOut">
               <a:rPr lang="en-US" smtClean="0"/>
               <a:pPr/>
-              <a:t>11/2/17</a:t>
+              <a:t>12/8/17</a:t>
             </a:fld>
             <a:endParaRPr lang="en-US"/>
           </a:p>
@@ -3960,7 +3960,7 @@
             <a:fld id="{844E2C54-3F4A-4984-9B06-D8EE6B21806F}" type="datetimeFigureOut">
               <a:rPr lang="en-US" smtClean="0"/>
               <a:pPr/>
-              <a:t>11/2/17</a:t>
+              <a:t>12/8/17</a:t>
             </a:fld>
             <a:endParaRPr lang="en-US"/>
           </a:p>
@@ -4379,7 +4379,7 @@
             <a:fld id="{844E2C54-3F4A-4984-9B06-D8EE6B21806F}" type="datetimeFigureOut">
               <a:rPr lang="en-US" smtClean="0"/>
               <a:pPr/>
-              <a:t>11/2/17</a:t>
+              <a:t>12/8/17</a:t>
             </a:fld>
             <a:endParaRPr lang="en-US"/>
           </a:p>
@@ -4494,7 +4494,7 @@
             <a:fld id="{844E2C54-3F4A-4984-9B06-D8EE6B21806F}" type="datetimeFigureOut">
               <a:rPr lang="en-US" smtClean="0"/>
               <a:pPr/>
-              <a:t>11/2/17</a:t>
+              <a:t>12/8/17</a:t>
             </a:fld>
             <a:endParaRPr lang="en-US"/>
           </a:p>
@@ -4586,7 +4586,7 @@
             <a:fld id="{844E2C54-3F4A-4984-9B06-D8EE6B21806F}" type="datetimeFigureOut">
               <a:rPr lang="en-US" smtClean="0"/>
               <a:pPr/>
-              <a:t>11/2/17</a:t>
+              <a:t>12/8/17</a:t>
             </a:fld>
             <a:endParaRPr lang="en-US"/>
           </a:p>
@@ -4860,7 +4860,7 @@
             <a:fld id="{844E2C54-3F4A-4984-9B06-D8EE6B21806F}" type="datetimeFigureOut">
               <a:rPr lang="en-US" smtClean="0"/>
               <a:pPr/>
-              <a:t>11/2/17</a:t>
+              <a:t>12/8/17</a:t>
             </a:fld>
             <a:endParaRPr lang="en-US"/>
           </a:p>
@@ -5110,7 +5110,7 @@
             <a:fld id="{844E2C54-3F4A-4984-9B06-D8EE6B21806F}" type="datetimeFigureOut">
               <a:rPr lang="en-US" smtClean="0"/>
               <a:pPr/>
-              <a:t>11/2/17</a:t>
+              <a:t>12/8/17</a:t>
             </a:fld>
             <a:endParaRPr lang="en-US"/>
           </a:p>
@@ -5320,7 +5320,7 @@
             <a:fld id="{844E2C54-3F4A-4984-9B06-D8EE6B21806F}" type="datetimeFigureOut">
               <a:rPr lang="en-US" smtClean="0"/>
               <a:pPr/>
-              <a:t>11/2/17</a:t>
+              <a:t>12/8/17</a:t>
             </a:fld>
             <a:endParaRPr lang="en-US"/>
           </a:p>
@@ -7335,27 +7335,27 @@
                 <a:latin typeface="Calibri" pitchFamily="34" charset="0"/>
                 <a:cs typeface="Calibri" pitchFamily="34" charset="0"/>
               </a:rPr>
-              <a:t> reactions, we can better identify regulatory mechanisms upstream of genome-wide differences in gene expression. The idea is to first infer the most likely transcription factors that regulate the differences in gene expression, then use protein-protein interactions to connect the identified transcription factors using additional proteins for building transcriptional regulatory subnetworks centered on these factors, and finally use kinase-substrate protein phosphorylation reactions, to identify and rank candidate protein-kinases that most likely regulate the formation of the identified transcriptional </a:t>
-            </a:r>
-            <a:r>
-              <a:rPr lang="en-US" sz="2800" dirty="0" err="1" smtClean="0">
+              <a:t> reactions, we can better identify regulatory mechanisms upstream of genome-wide differences in gene expression. The idea is to first infer the most likely transcription factors that regulate the differences in gene expression, then use protein-protein interactions to connect the identified transcription factors using additional proteins for building transcriptional regulatory subnetworks centered on these factors, and finally use kinase-substrate protein phosphorylation reactions, to identify and rank candidate protein-kinases that most likely regulate the formation of the identified </a:t>
+            </a:r>
+            <a:r>
+              <a:rPr lang="en-US" sz="2800">
                 <a:solidFill>
                   <a:schemeClr val="tx1"/>
                 </a:solidFill>
                 <a:latin typeface="Calibri" pitchFamily="34" charset="0"/>
                 <a:cs typeface="Calibri" pitchFamily="34" charset="0"/>
               </a:rPr>
-              <a:t>complexes.cThis</a:t>
-            </a:r>
-            <a:r>
-              <a:rPr lang="en-US" sz="2800" dirty="0" smtClean="0">
+              <a:t>transcriptional </a:t>
+            </a:r>
+            <a:r>
+              <a:rPr lang="en-US" sz="2800" smtClean="0">
                 <a:solidFill>
                   <a:schemeClr val="tx1"/>
                 </a:solidFill>
                 <a:latin typeface="Calibri" pitchFamily="34" charset="0"/>
                 <a:cs typeface="Calibri" pitchFamily="34" charset="0"/>
               </a:rPr>
-              <a:t> </a:t>
+              <a:t>complexes. This </a:t>
             </a:r>
             <a:r>
               <a:rPr lang="en-US" sz="2800" dirty="0">
@@ -7378,7 +7378,7 @@
           <a:p>
             <a:pPr algn="just"/>
             <a:r>
-              <a:rPr lang="en-US" sz="2800">
+              <a:rPr lang="en-US" sz="2800" dirty="0">
                 <a:solidFill>
                   <a:schemeClr val="tx1"/>
                 </a:solidFill>
@@ -7388,24 +7388,14 @@
               <a:t> </a:t>
             </a:r>
             <a:r>
-              <a:rPr lang="en-US" sz="2800" smtClean="0">
+              <a:rPr lang="en-US" sz="2800" dirty="0" smtClean="0">
                 <a:solidFill>
                   <a:schemeClr val="tx1"/>
                 </a:solidFill>
                 <a:latin typeface="Calibri" pitchFamily="34" charset="0"/>
                 <a:cs typeface="Calibri" pitchFamily="34" charset="0"/>
               </a:rPr>
-              <a:t>    </a:t>
-            </a:r>
-            <a:r>
-              <a:rPr lang="en-US" sz="2800" smtClean="0">
-                <a:solidFill>
-                  <a:schemeClr val="tx1"/>
-                </a:solidFill>
-                <a:latin typeface="Calibri" pitchFamily="34" charset="0"/>
-                <a:cs typeface="Calibri" pitchFamily="34" charset="0"/>
-              </a:rPr>
-              <a:t>In </a:t>
+              <a:t>    In </a:t>
             </a:r>
             <a:r>
               <a:rPr lang="en-US" sz="2800" dirty="0">

</xml_diff>